<commit_message>
Building out contact pg
</commit_message>
<xml_diff>
--- a/static/images/parking_model_diagram.pptx
+++ b/static/images/parking_model_diagram.pptx
@@ -5,11 +5,12 @@
     <p:sldMasterId id="2147483648" r:id="rId1"/>
   </p:sldMasterIdLst>
   <p:notesMasterIdLst>
-    <p:notesMasterId r:id="rId4"/>
+    <p:notesMasterId r:id="rId5"/>
   </p:notesMasterIdLst>
   <p:sldIdLst>
     <p:sldId id="256" r:id="rId2"/>
     <p:sldId id="259" r:id="rId3"/>
+    <p:sldId id="260" r:id="rId4"/>
   </p:sldIdLst>
   <p:sldSz cx="12192000" cy="6858000"/>
   <p:notesSz cx="6858000" cy="9144000"/>
@@ -4464,6 +4465,44 @@
     <p:extLst>
       <p:ext uri="{BB962C8B-B14F-4D97-AF65-F5344CB8AC3E}">
         <p14:creationId xmlns:p14="http://schemas.microsoft.com/office/powerpoint/2010/main" val="1954138404"/>
+      </p:ext>
+    </p:extLst>
+  </p:cSld>
+  <p:clrMapOvr>
+    <a:masterClrMapping/>
+  </p:clrMapOvr>
+</p:sld>
+</file>
+
+<file path=ppt/slides/slide3.xml><?xml version="1.0" encoding="utf-8"?>
+<p:sld xmlns:a="http://schemas.openxmlformats.org/drawingml/2006/main" xmlns:r="http://schemas.openxmlformats.org/officeDocument/2006/relationships" xmlns:p="http://schemas.openxmlformats.org/presentationml/2006/main">
+  <p:cSld>
+    <p:bg>
+      <p:bgPr>
+        <a:solidFill>
+          <a:srgbClr val="212529"/>
+        </a:solidFill>
+        <a:effectLst/>
+      </p:bgPr>
+    </p:bg>
+    <p:spTree>
+      <p:nvGrpSpPr>
+        <p:cNvPr id="1" name=""/>
+        <p:cNvGrpSpPr/>
+        <p:nvPr/>
+      </p:nvGrpSpPr>
+      <p:grpSpPr>
+        <a:xfrm>
+          <a:off x="0" y="0"/>
+          <a:ext cx="0" cy="0"/>
+          <a:chOff x="0" y="0"/>
+          <a:chExt cx="0" cy="0"/>
+        </a:xfrm>
+      </p:grpSpPr>
+    </p:spTree>
+    <p:extLst>
+      <p:ext uri="{BB962C8B-B14F-4D97-AF65-F5344CB8AC3E}">
+        <p14:creationId xmlns:p14="http://schemas.microsoft.com/office/powerpoint/2010/main" val="2531588090"/>
       </p:ext>
     </p:extLst>
   </p:cSld>

</xml_diff>

<commit_message>
Added next steps chart, default options for form
</commit_message>
<xml_diff>
--- a/static/images/parking_model_diagram.pptx
+++ b/static/images/parking_model_diagram.pptx
@@ -199,7 +199,7 @@
           <a:p>
             <a:fld id="{07700D8A-0234-EE4B-A591-97A8B6E7BB8D}" type="datetimeFigureOut">
               <a:rPr lang="en-US" smtClean="0"/>
-              <a:t>2/14/22</a:t>
+              <a:t>2/15/22</a:t>
             </a:fld>
             <a:endParaRPr lang="en-US"/>
           </a:p>
@@ -697,7 +697,7 @@
           <a:p>
             <a:fld id="{F4152273-3BB8-2D47-9B97-809FB3B4ED9B}" type="datetimeFigureOut">
               <a:rPr lang="en-US" smtClean="0"/>
-              <a:t>2/14/22</a:t>
+              <a:t>2/15/22</a:t>
             </a:fld>
             <a:endParaRPr lang="en-US"/>
           </a:p>
@@ -895,7 +895,7 @@
           <a:p>
             <a:fld id="{F4152273-3BB8-2D47-9B97-809FB3B4ED9B}" type="datetimeFigureOut">
               <a:rPr lang="en-US" smtClean="0"/>
-              <a:t>2/14/22</a:t>
+              <a:t>2/15/22</a:t>
             </a:fld>
             <a:endParaRPr lang="en-US"/>
           </a:p>
@@ -1103,7 +1103,7 @@
           <a:p>
             <a:fld id="{F4152273-3BB8-2D47-9B97-809FB3B4ED9B}" type="datetimeFigureOut">
               <a:rPr lang="en-US" smtClean="0"/>
-              <a:t>2/14/22</a:t>
+              <a:t>2/15/22</a:t>
             </a:fld>
             <a:endParaRPr lang="en-US"/>
           </a:p>
@@ -1301,7 +1301,7 @@
           <a:p>
             <a:fld id="{F4152273-3BB8-2D47-9B97-809FB3B4ED9B}" type="datetimeFigureOut">
               <a:rPr lang="en-US" smtClean="0"/>
-              <a:t>2/14/22</a:t>
+              <a:t>2/15/22</a:t>
             </a:fld>
             <a:endParaRPr lang="en-US"/>
           </a:p>
@@ -1576,7 +1576,7 @@
           <a:p>
             <a:fld id="{F4152273-3BB8-2D47-9B97-809FB3B4ED9B}" type="datetimeFigureOut">
               <a:rPr lang="en-US" smtClean="0"/>
-              <a:t>2/14/22</a:t>
+              <a:t>2/15/22</a:t>
             </a:fld>
             <a:endParaRPr lang="en-US"/>
           </a:p>
@@ -1841,7 +1841,7 @@
           <a:p>
             <a:fld id="{F4152273-3BB8-2D47-9B97-809FB3B4ED9B}" type="datetimeFigureOut">
               <a:rPr lang="en-US" smtClean="0"/>
-              <a:t>2/14/22</a:t>
+              <a:t>2/15/22</a:t>
             </a:fld>
             <a:endParaRPr lang="en-US"/>
           </a:p>
@@ -2253,7 +2253,7 @@
           <a:p>
             <a:fld id="{F4152273-3BB8-2D47-9B97-809FB3B4ED9B}" type="datetimeFigureOut">
               <a:rPr lang="en-US" smtClean="0"/>
-              <a:t>2/14/22</a:t>
+              <a:t>2/15/22</a:t>
             </a:fld>
             <a:endParaRPr lang="en-US"/>
           </a:p>
@@ -2394,7 +2394,7 @@
           <a:p>
             <a:fld id="{F4152273-3BB8-2D47-9B97-809FB3B4ED9B}" type="datetimeFigureOut">
               <a:rPr lang="en-US" smtClean="0"/>
-              <a:t>2/14/22</a:t>
+              <a:t>2/15/22</a:t>
             </a:fld>
             <a:endParaRPr lang="en-US"/>
           </a:p>
@@ -2507,7 +2507,7 @@
           <a:p>
             <a:fld id="{F4152273-3BB8-2D47-9B97-809FB3B4ED9B}" type="datetimeFigureOut">
               <a:rPr lang="en-US" smtClean="0"/>
-              <a:t>2/14/22</a:t>
+              <a:t>2/15/22</a:t>
             </a:fld>
             <a:endParaRPr lang="en-US"/>
           </a:p>
@@ -2818,7 +2818,7 @@
           <a:p>
             <a:fld id="{F4152273-3BB8-2D47-9B97-809FB3B4ED9B}" type="datetimeFigureOut">
               <a:rPr lang="en-US" smtClean="0"/>
-              <a:t>2/14/22</a:t>
+              <a:t>2/15/22</a:t>
             </a:fld>
             <a:endParaRPr lang="en-US"/>
           </a:p>
@@ -3106,7 +3106,7 @@
           <a:p>
             <a:fld id="{F4152273-3BB8-2D47-9B97-809FB3B4ED9B}" type="datetimeFigureOut">
               <a:rPr lang="en-US" smtClean="0"/>
-              <a:t>2/14/22</a:t>
+              <a:t>2/15/22</a:t>
             </a:fld>
             <a:endParaRPr lang="en-US"/>
           </a:p>
@@ -3347,7 +3347,7 @@
           <a:p>
             <a:fld id="{F4152273-3BB8-2D47-9B97-809FB3B4ED9B}" type="datetimeFigureOut">
               <a:rPr lang="en-US" smtClean="0"/>
-              <a:t>2/14/22</a:t>
+              <a:t>2/15/22</a:t>
             </a:fld>
             <a:endParaRPr lang="en-US"/>
           </a:p>
@@ -4499,6 +4499,369 @@
           <a:chExt cx="0" cy="0"/>
         </a:xfrm>
       </p:grpSpPr>
+      <p:grpSp>
+        <p:nvGrpSpPr>
+          <p:cNvPr id="14" name="Group 13">
+            <a:extLst>
+              <a:ext uri="{FF2B5EF4-FFF2-40B4-BE49-F238E27FC236}">
+                <a16:creationId xmlns:a16="http://schemas.microsoft.com/office/drawing/2014/main" id="{2EC9EE7B-A893-7243-A886-23F8160E9CBE}"/>
+              </a:ext>
+            </a:extLst>
+          </p:cNvPr>
+          <p:cNvGrpSpPr/>
+          <p:nvPr/>
+        </p:nvGrpSpPr>
+        <p:grpSpPr>
+          <a:xfrm>
+            <a:off x="-68758" y="159406"/>
+            <a:ext cx="1711412" cy="2339969"/>
+            <a:chOff x="-68758" y="159406"/>
+            <a:chExt cx="1711412" cy="2339969"/>
+          </a:xfrm>
+        </p:grpSpPr>
+        <p:pic>
+          <p:nvPicPr>
+            <p:cNvPr id="3" name="Picture 2">
+              <a:extLst>
+                <a:ext uri="{FF2B5EF4-FFF2-40B4-BE49-F238E27FC236}">
+                  <a16:creationId xmlns:a16="http://schemas.microsoft.com/office/drawing/2014/main" id="{8E5C4F31-4E93-E94C-9D95-E9E15AC7F8B8}"/>
+                </a:ext>
+              </a:extLst>
+            </p:cNvPr>
+            <p:cNvPicPr>
+              <a:picLocks noChangeAspect="1"/>
+            </p:cNvPicPr>
+            <p:nvPr/>
+          </p:nvPicPr>
+          <p:blipFill>
+            <a:blip r:embed="rId2"/>
+            <a:stretch>
+              <a:fillRect/>
+            </a:stretch>
+          </p:blipFill>
+          <p:spPr>
+            <a:xfrm>
+              <a:off x="-68758" y="159406"/>
+              <a:ext cx="1711411" cy="1711411"/>
+            </a:xfrm>
+            <a:prstGeom prst="rect">
+              <a:avLst/>
+            </a:prstGeom>
+          </p:spPr>
+        </p:pic>
+        <p:sp>
+          <p:nvSpPr>
+            <p:cNvPr id="10" name="TextBox 9">
+              <a:extLst>
+                <a:ext uri="{FF2B5EF4-FFF2-40B4-BE49-F238E27FC236}">
+                  <a16:creationId xmlns:a16="http://schemas.microsoft.com/office/drawing/2014/main" id="{C060949B-724C-494C-80AE-0626FEBBFFE2}"/>
+                </a:ext>
+              </a:extLst>
+            </p:cNvPr>
+            <p:cNvSpPr txBox="1"/>
+            <p:nvPr/>
+          </p:nvSpPr>
+          <p:spPr>
+            <a:xfrm>
+              <a:off x="-68758" y="2037710"/>
+              <a:ext cx="1711412" cy="461665"/>
+            </a:xfrm>
+            <a:prstGeom prst="rect">
+              <a:avLst/>
+            </a:prstGeom>
+            <a:noFill/>
+          </p:spPr>
+          <p:txBody>
+            <a:bodyPr wrap="square" rtlCol="0">
+              <a:spAutoFit/>
+            </a:bodyPr>
+            <a:lstStyle/>
+            <a:p>
+              <a:pPr algn="ctr"/>
+              <a:r>
+                <a:rPr lang="en-US" sz="2400" b="1" dirty="0">
+                  <a:solidFill>
+                    <a:srgbClr val="5298C9"/>
+                  </a:solidFill>
+                </a:rPr>
+                <a:t>More Data</a:t>
+              </a:r>
+            </a:p>
+          </p:txBody>
+        </p:sp>
+      </p:grpSp>
+      <p:grpSp>
+        <p:nvGrpSpPr>
+          <p:cNvPr id="16" name="Group 15">
+            <a:extLst>
+              <a:ext uri="{FF2B5EF4-FFF2-40B4-BE49-F238E27FC236}">
+                <a16:creationId xmlns:a16="http://schemas.microsoft.com/office/drawing/2014/main" id="{CC7A58FE-F9B2-9946-BDA8-48306EAAAF9F}"/>
+              </a:ext>
+            </a:extLst>
+          </p:cNvPr>
+          <p:cNvGrpSpPr/>
+          <p:nvPr/>
+        </p:nvGrpSpPr>
+        <p:grpSpPr>
+          <a:xfrm>
+            <a:off x="5633630" y="238713"/>
+            <a:ext cx="3457903" cy="2260662"/>
+            <a:chOff x="5955372" y="238713"/>
+            <a:chExt cx="3457903" cy="2260662"/>
+          </a:xfrm>
+        </p:grpSpPr>
+        <p:pic>
+          <p:nvPicPr>
+            <p:cNvPr id="7" name="Picture 6">
+              <a:extLst>
+                <a:ext uri="{FF2B5EF4-FFF2-40B4-BE49-F238E27FC236}">
+                  <a16:creationId xmlns:a16="http://schemas.microsoft.com/office/drawing/2014/main" id="{4265E88B-7108-3949-9D9F-D44867037CC0}"/>
+                </a:ext>
+              </a:extLst>
+            </p:cNvPr>
+            <p:cNvPicPr>
+              <a:picLocks noChangeAspect="1"/>
+            </p:cNvPicPr>
+            <p:nvPr/>
+          </p:nvPicPr>
+          <p:blipFill>
+            <a:blip r:embed="rId3"/>
+            <a:stretch>
+              <a:fillRect/>
+            </a:stretch>
+          </p:blipFill>
+          <p:spPr>
+            <a:xfrm>
+              <a:off x="6828618" y="238713"/>
+              <a:ext cx="1711411" cy="1711411"/>
+            </a:xfrm>
+            <a:prstGeom prst="rect">
+              <a:avLst/>
+            </a:prstGeom>
+          </p:spPr>
+        </p:pic>
+        <p:sp>
+          <p:nvSpPr>
+            <p:cNvPr id="11" name="TextBox 10">
+              <a:extLst>
+                <a:ext uri="{FF2B5EF4-FFF2-40B4-BE49-F238E27FC236}">
+                  <a16:creationId xmlns:a16="http://schemas.microsoft.com/office/drawing/2014/main" id="{C25FE182-4D4B-9149-BB65-FB52925AACCC}"/>
+                </a:ext>
+              </a:extLst>
+            </p:cNvPr>
+            <p:cNvSpPr txBox="1"/>
+            <p:nvPr/>
+          </p:nvSpPr>
+          <p:spPr>
+            <a:xfrm>
+              <a:off x="5955372" y="2037710"/>
+              <a:ext cx="3457903" cy="461665"/>
+            </a:xfrm>
+            <a:prstGeom prst="rect">
+              <a:avLst/>
+            </a:prstGeom>
+            <a:noFill/>
+          </p:spPr>
+          <p:txBody>
+            <a:bodyPr wrap="square" rtlCol="0">
+              <a:spAutoFit/>
+            </a:bodyPr>
+            <a:lstStyle/>
+            <a:p>
+              <a:pPr algn="ctr"/>
+              <a:r>
+                <a:rPr lang="en-US" sz="2400" b="1" dirty="0">
+                  <a:solidFill>
+                    <a:srgbClr val="5298C9"/>
+                  </a:solidFill>
+                </a:rPr>
+                <a:t>Hyperparameter Tuning</a:t>
+              </a:r>
+            </a:p>
+          </p:txBody>
+        </p:sp>
+      </p:grpSp>
+      <p:grpSp>
+        <p:nvGrpSpPr>
+          <p:cNvPr id="15" name="Group 14">
+            <a:extLst>
+              <a:ext uri="{FF2B5EF4-FFF2-40B4-BE49-F238E27FC236}">
+                <a16:creationId xmlns:a16="http://schemas.microsoft.com/office/drawing/2014/main" id="{01FD7301-DC0A-DD41-9421-1C9065AE35DC}"/>
+              </a:ext>
+            </a:extLst>
+          </p:cNvPr>
+          <p:cNvGrpSpPr/>
+          <p:nvPr/>
+        </p:nvGrpSpPr>
+        <p:grpSpPr>
+          <a:xfrm>
+            <a:off x="2281864" y="238713"/>
+            <a:ext cx="2712556" cy="2260662"/>
+            <a:chOff x="2763335" y="238713"/>
+            <a:chExt cx="2712556" cy="2260662"/>
+          </a:xfrm>
+        </p:grpSpPr>
+        <p:pic>
+          <p:nvPicPr>
+            <p:cNvPr id="5" name="Picture 4">
+              <a:extLst>
+                <a:ext uri="{FF2B5EF4-FFF2-40B4-BE49-F238E27FC236}">
+                  <a16:creationId xmlns:a16="http://schemas.microsoft.com/office/drawing/2014/main" id="{31FC2192-E82D-2D46-B0C7-3A3B421F0259}"/>
+                </a:ext>
+              </a:extLst>
+            </p:cNvPr>
+            <p:cNvPicPr>
+              <a:picLocks noChangeAspect="1"/>
+            </p:cNvPicPr>
+            <p:nvPr/>
+          </p:nvPicPr>
+          <p:blipFill>
+            <a:blip r:embed="rId4"/>
+            <a:stretch>
+              <a:fillRect/>
+            </a:stretch>
+          </p:blipFill>
+          <p:spPr>
+            <a:xfrm>
+              <a:off x="3263908" y="238713"/>
+              <a:ext cx="1711411" cy="1711411"/>
+            </a:xfrm>
+            <a:prstGeom prst="rect">
+              <a:avLst/>
+            </a:prstGeom>
+          </p:spPr>
+        </p:pic>
+        <p:sp>
+          <p:nvSpPr>
+            <p:cNvPr id="12" name="TextBox 11">
+              <a:extLst>
+                <a:ext uri="{FF2B5EF4-FFF2-40B4-BE49-F238E27FC236}">
+                  <a16:creationId xmlns:a16="http://schemas.microsoft.com/office/drawing/2014/main" id="{AB1873D9-347B-054A-8770-6872F817224A}"/>
+                </a:ext>
+              </a:extLst>
+            </p:cNvPr>
+            <p:cNvSpPr txBox="1"/>
+            <p:nvPr/>
+          </p:nvSpPr>
+          <p:spPr>
+            <a:xfrm>
+              <a:off x="2763335" y="2037710"/>
+              <a:ext cx="2712556" cy="461665"/>
+            </a:xfrm>
+            <a:prstGeom prst="rect">
+              <a:avLst/>
+            </a:prstGeom>
+            <a:noFill/>
+          </p:spPr>
+          <p:txBody>
+            <a:bodyPr wrap="square" rtlCol="0">
+              <a:spAutoFit/>
+            </a:bodyPr>
+            <a:lstStyle/>
+            <a:p>
+              <a:r>
+                <a:rPr lang="en-US" sz="2400" b="1" dirty="0">
+                  <a:solidFill>
+                    <a:srgbClr val="5298C9"/>
+                  </a:solidFill>
+                </a:rPr>
+                <a:t>Feature Engineering</a:t>
+              </a:r>
+            </a:p>
+          </p:txBody>
+        </p:sp>
+      </p:grpSp>
+      <p:grpSp>
+        <p:nvGrpSpPr>
+          <p:cNvPr id="17" name="Group 16">
+            <a:extLst>
+              <a:ext uri="{FF2B5EF4-FFF2-40B4-BE49-F238E27FC236}">
+                <a16:creationId xmlns:a16="http://schemas.microsoft.com/office/drawing/2014/main" id="{FBB5E2F3-89DB-2543-B4C7-FE89E5B9C189}"/>
+              </a:ext>
+            </a:extLst>
+          </p:cNvPr>
+          <p:cNvGrpSpPr/>
+          <p:nvPr/>
+        </p:nvGrpSpPr>
+        <p:grpSpPr>
+          <a:xfrm>
+            <a:off x="9730744" y="238713"/>
+            <a:ext cx="2461256" cy="2260662"/>
+            <a:chOff x="9428666" y="238713"/>
+            <a:chExt cx="2461256" cy="2260662"/>
+          </a:xfrm>
+        </p:grpSpPr>
+        <p:pic>
+          <p:nvPicPr>
+            <p:cNvPr id="9" name="Picture 8">
+              <a:extLst>
+                <a:ext uri="{FF2B5EF4-FFF2-40B4-BE49-F238E27FC236}">
+                  <a16:creationId xmlns:a16="http://schemas.microsoft.com/office/drawing/2014/main" id="{81A66D21-4B47-614F-BFDD-A66B54721472}"/>
+                </a:ext>
+              </a:extLst>
+            </p:cNvPr>
+            <p:cNvPicPr>
+              <a:picLocks noChangeAspect="1"/>
+            </p:cNvPicPr>
+            <p:nvPr/>
+          </p:nvPicPr>
+          <p:blipFill>
+            <a:blip r:embed="rId5"/>
+            <a:stretch>
+              <a:fillRect/>
+            </a:stretch>
+          </p:blipFill>
+          <p:spPr>
+            <a:xfrm>
+              <a:off x="9803589" y="238713"/>
+              <a:ext cx="1711411" cy="1711411"/>
+            </a:xfrm>
+            <a:prstGeom prst="rect">
+              <a:avLst/>
+            </a:prstGeom>
+          </p:spPr>
+        </p:pic>
+        <p:sp>
+          <p:nvSpPr>
+            <p:cNvPr id="13" name="TextBox 12">
+              <a:extLst>
+                <a:ext uri="{FF2B5EF4-FFF2-40B4-BE49-F238E27FC236}">
+                  <a16:creationId xmlns:a16="http://schemas.microsoft.com/office/drawing/2014/main" id="{0E5B69FC-5E85-D645-880E-881E5B774929}"/>
+                </a:ext>
+              </a:extLst>
+            </p:cNvPr>
+            <p:cNvSpPr txBox="1"/>
+            <p:nvPr/>
+          </p:nvSpPr>
+          <p:spPr>
+            <a:xfrm>
+              <a:off x="9428666" y="2037710"/>
+              <a:ext cx="2461256" cy="461665"/>
+            </a:xfrm>
+            <a:prstGeom prst="rect">
+              <a:avLst/>
+            </a:prstGeom>
+            <a:noFill/>
+          </p:spPr>
+          <p:txBody>
+            <a:bodyPr wrap="square" rtlCol="0">
+              <a:spAutoFit/>
+            </a:bodyPr>
+            <a:lstStyle/>
+            <a:p>
+              <a:pPr algn="ctr"/>
+              <a:r>
+                <a:rPr lang="en-US" sz="2400" b="1" dirty="0">
+                  <a:solidFill>
+                    <a:srgbClr val="5298C9"/>
+                  </a:solidFill>
+                </a:rPr>
+                <a:t>Neural Network</a:t>
+              </a:r>
+            </a:p>
+          </p:txBody>
+        </p:sp>
+      </p:grpSp>
     </p:spTree>
     <p:extLst>
       <p:ext uri="{BB962C8B-B14F-4D97-AF65-F5344CB8AC3E}">

</xml_diff>